<commit_message>
Completed figure 6 and creating the flow chart in figure 5.
</commit_message>
<xml_diff>
--- a/Manuscript/Figures/03_DATA_Distribution_PointFR_GridFR.pptx
+++ b/Manuscript/Figures/03_DATA_Distribution_PointFR_GridFR.pptx
@@ -104,19 +104,112 @@
       </a:defRPr>
     </a:lvl9pPr>
   </p:defaultTextStyle>
+  <p:extLst>
+    <p:ext uri="{EFAFB233-063F-42B5-8137-9DF3F51BA10A}">
+      <p15:sldGuideLst xmlns:p15="http://schemas.microsoft.com/office/powerpoint/2012/main"/>
+    </p:ext>
+  </p:extLst>
 </p:presentation>
 </file>
 
 <file path=ppt/revisionInfo.xml><?xml version="1.0" encoding="utf-8"?>
 <p1510:revInfo xmlns:a="http://schemas.openxmlformats.org/drawingml/2006/main" xmlns:r="http://schemas.openxmlformats.org/officeDocument/2006/relationships" xmlns:p1510="http://schemas.microsoft.com/office/powerpoint/2015/10/main">
   <p1510:revLst>
-    <p1510:client id="{9FBA2D84-4D74-4B37-B231-128E41B038F3}" v="20" dt="2023-10-12T13:44:36.104"/>
+    <p1510:client id="{8A36BEE9-A0E0-4169-995B-16C23758EDFC}" v="2" dt="2023-10-13T15:12:02.304"/>
   </p1510:revLst>
 </p1510:revInfo>
 </file>
 
 <file path=ppt/changesInfos/changesInfo1.xml><?xml version="1.0" encoding="utf-8"?>
 <pc:chgInfo xmlns:a="http://schemas.openxmlformats.org/drawingml/2006/main" xmlns:r="http://schemas.openxmlformats.org/officeDocument/2006/relationships" xmlns:ac="http://schemas.microsoft.com/office/drawing/2013/main/command" xmlns:pc="http://schemas.microsoft.com/office/powerpoint/2013/main/command">
+  <pc:docChgLst>
+    <pc:chgData name="Fatima Pillosu" userId="a6295d4dc9e22643" providerId="LiveId" clId="{8A36BEE9-A0E0-4169-995B-16C23758EDFC}"/>
+    <pc:docChg chg="custSel modSld">
+      <pc:chgData name="Fatima Pillosu" userId="a6295d4dc9e22643" providerId="LiveId" clId="{8A36BEE9-A0E0-4169-995B-16C23758EDFC}" dt="2023-10-13T15:15:59.452" v="257" actId="14100"/>
+      <pc:docMkLst>
+        <pc:docMk/>
+      </pc:docMkLst>
+      <pc:sldChg chg="addSp delSp modSp mod">
+        <pc:chgData name="Fatima Pillosu" userId="a6295d4dc9e22643" providerId="LiveId" clId="{8A36BEE9-A0E0-4169-995B-16C23758EDFC}" dt="2023-10-13T15:15:59.452" v="257" actId="14100"/>
+        <pc:sldMkLst>
+          <pc:docMk/>
+          <pc:sldMk cId="774958197" sldId="257"/>
+        </pc:sldMkLst>
+        <pc:spChg chg="add del mod">
+          <ac:chgData name="Fatima Pillosu" userId="a6295d4dc9e22643" providerId="LiveId" clId="{8A36BEE9-A0E0-4169-995B-16C23758EDFC}" dt="2023-10-13T15:11:41.735" v="198" actId="478"/>
+          <ac:spMkLst>
+            <pc:docMk/>
+            <pc:sldMk cId="774958197" sldId="257"/>
+            <ac:spMk id="6" creationId="{A13A12BA-350B-4771-58EC-232030AF73E6}"/>
+          </ac:spMkLst>
+        </pc:spChg>
+        <pc:spChg chg="mod">
+          <ac:chgData name="Fatima Pillosu" userId="a6295d4dc9e22643" providerId="LiveId" clId="{8A36BEE9-A0E0-4169-995B-16C23758EDFC}" dt="2023-10-13T15:01:33.992" v="46" actId="1035"/>
+          <ac:spMkLst>
+            <pc:docMk/>
+            <pc:sldMk cId="774958197" sldId="257"/>
+            <ac:spMk id="17" creationId="{FE0C34CF-3C52-D346-AE99-748C15729FE0}"/>
+          </ac:spMkLst>
+        </pc:spChg>
+        <pc:spChg chg="mod ord">
+          <ac:chgData name="Fatima Pillosu" userId="a6295d4dc9e22643" providerId="LiveId" clId="{8A36BEE9-A0E0-4169-995B-16C23758EDFC}" dt="2023-10-13T15:13:44.850" v="249" actId="1076"/>
+          <ac:spMkLst>
+            <pc:docMk/>
+            <pc:sldMk cId="774958197" sldId="257"/>
+            <ac:spMk id="24" creationId="{2F6F4F95-4456-CA27-EDD8-D4E77557DB2F}"/>
+          </ac:spMkLst>
+        </pc:spChg>
+        <pc:spChg chg="ord">
+          <ac:chgData name="Fatima Pillosu" userId="a6295d4dc9e22643" providerId="LiveId" clId="{8A36BEE9-A0E0-4169-995B-16C23758EDFC}" dt="2023-10-13T15:12:50.897" v="208" actId="166"/>
+          <ac:spMkLst>
+            <pc:docMk/>
+            <pc:sldMk cId="774958197" sldId="257"/>
+            <ac:spMk id="25" creationId="{3E8F90AB-5F87-A815-AE7B-A4BD0480AE01}"/>
+          </ac:spMkLst>
+        </pc:spChg>
+        <pc:grpChg chg="mod ord">
+          <ac:chgData name="Fatima Pillosu" userId="a6295d4dc9e22643" providerId="LiveId" clId="{8A36BEE9-A0E0-4169-995B-16C23758EDFC}" dt="2023-10-13T15:13:34.921" v="248" actId="1038"/>
+          <ac:grpSpMkLst>
+            <pc:docMk/>
+            <pc:sldMk cId="774958197" sldId="257"/>
+            <ac:grpSpMk id="16" creationId="{DA4A567F-F33B-FF3E-8C7C-8D8CF9A1384B}"/>
+          </ac:grpSpMkLst>
+        </pc:grpChg>
+        <pc:picChg chg="del">
+          <ac:chgData name="Fatima Pillosu" userId="a6295d4dc9e22643" providerId="LiveId" clId="{8A36BEE9-A0E0-4169-995B-16C23758EDFC}" dt="2023-10-13T15:11:44.873" v="199" actId="478"/>
+          <ac:picMkLst>
+            <pc:docMk/>
+            <pc:sldMk cId="774958197" sldId="257"/>
+            <ac:picMk id="7" creationId="{A252A875-1706-DF84-0670-4CFDB46BA51A}"/>
+          </ac:picMkLst>
+        </pc:picChg>
+        <pc:picChg chg="add mod ord modCrop">
+          <ac:chgData name="Fatima Pillosu" userId="a6295d4dc9e22643" providerId="LiveId" clId="{8A36BEE9-A0E0-4169-995B-16C23758EDFC}" dt="2023-10-13T15:13:16.518" v="220" actId="1038"/>
+          <ac:picMkLst>
+            <pc:docMk/>
+            <pc:sldMk cId="774958197" sldId="257"/>
+            <ac:picMk id="20" creationId="{25AAFF9D-6E71-039E-867B-CED568217B78}"/>
+          </ac:picMkLst>
+        </pc:picChg>
+        <pc:cxnChg chg="mod ord">
+          <ac:chgData name="Fatima Pillosu" userId="a6295d4dc9e22643" providerId="LiveId" clId="{8A36BEE9-A0E0-4169-995B-16C23758EDFC}" dt="2023-10-13T15:15:59.452" v="257" actId="14100"/>
+          <ac:cxnSpMkLst>
+            <pc:docMk/>
+            <pc:sldMk cId="774958197" sldId="257"/>
+            <ac:cxnSpMk id="18" creationId="{25801BE7-FD7F-5655-75E2-743E85814141}"/>
+          </ac:cxnSpMkLst>
+        </pc:cxnChg>
+        <pc:cxnChg chg="mod ord">
+          <ac:chgData name="Fatima Pillosu" userId="a6295d4dc9e22643" providerId="LiveId" clId="{8A36BEE9-A0E0-4169-995B-16C23758EDFC}" dt="2023-10-13T15:15:52.855" v="256" actId="14100"/>
+          <ac:cxnSpMkLst>
+            <pc:docMk/>
+            <pc:sldMk cId="774958197" sldId="257"/>
+            <ac:cxnSpMk id="19" creationId="{3F54F372-1684-2E73-F299-5A7D9836C7C9}"/>
+          </ac:cxnSpMkLst>
+        </pc:cxnChg>
+      </pc:sldChg>
+    </pc:docChg>
+  </pc:docChgLst>
   <pc:docChgLst>
     <pc:chgData name="Fatima Pillosu" userId="a6295d4dc9e22643" providerId="LiveId" clId="{9FBA2D84-4D74-4B37-B231-128E41B038F3}"/>
     <pc:docChg chg="undo custSel addSld delSld modSld">
@@ -778,7 +871,7 @@
           <a:p>
             <a:fld id="{2DD104BE-0EAA-4A20-A3C6-F09237843F02}" type="datetimeFigureOut">
               <a:rPr lang="en-GB" smtClean="0"/>
-              <a:t>10/10/2023</a:t>
+              <a:t>13/10/2023</a:t>
             </a:fld>
             <a:endParaRPr lang="en-GB"/>
           </a:p>
@@ -820,7 +913,7 @@
           <a:p>
             <a:fld id="{F1887760-7E0C-4499-A274-308086744EC6}" type="slidenum">
               <a:rPr lang="en-GB" smtClean="0"/>
-              <a:t>‹#›</a:t>
+              <a:t>‹N›</a:t>
             </a:fld>
             <a:endParaRPr lang="en-GB"/>
           </a:p>
@@ -948,7 +1041,7 @@
           <a:p>
             <a:fld id="{2DD104BE-0EAA-4A20-A3C6-F09237843F02}" type="datetimeFigureOut">
               <a:rPr lang="en-GB" smtClean="0"/>
-              <a:t>10/10/2023</a:t>
+              <a:t>13/10/2023</a:t>
             </a:fld>
             <a:endParaRPr lang="en-GB"/>
           </a:p>
@@ -990,7 +1083,7 @@
           <a:p>
             <a:fld id="{F1887760-7E0C-4499-A274-308086744EC6}" type="slidenum">
               <a:rPr lang="en-GB" smtClean="0"/>
-              <a:t>‹#›</a:t>
+              <a:t>‹N›</a:t>
             </a:fld>
             <a:endParaRPr lang="en-GB"/>
           </a:p>
@@ -1128,7 +1221,7 @@
           <a:p>
             <a:fld id="{2DD104BE-0EAA-4A20-A3C6-F09237843F02}" type="datetimeFigureOut">
               <a:rPr lang="en-GB" smtClean="0"/>
-              <a:t>10/10/2023</a:t>
+              <a:t>13/10/2023</a:t>
             </a:fld>
             <a:endParaRPr lang="en-GB"/>
           </a:p>
@@ -1170,7 +1263,7 @@
           <a:p>
             <a:fld id="{F1887760-7E0C-4499-A274-308086744EC6}" type="slidenum">
               <a:rPr lang="en-GB" smtClean="0"/>
-              <a:t>‹#›</a:t>
+              <a:t>‹N›</a:t>
             </a:fld>
             <a:endParaRPr lang="en-GB"/>
           </a:p>
@@ -1298,7 +1391,7 @@
           <a:p>
             <a:fld id="{2DD104BE-0EAA-4A20-A3C6-F09237843F02}" type="datetimeFigureOut">
               <a:rPr lang="en-GB" smtClean="0"/>
-              <a:t>10/10/2023</a:t>
+              <a:t>13/10/2023</a:t>
             </a:fld>
             <a:endParaRPr lang="en-GB"/>
           </a:p>
@@ -1340,7 +1433,7 @@
           <a:p>
             <a:fld id="{F1887760-7E0C-4499-A274-308086744EC6}" type="slidenum">
               <a:rPr lang="en-GB" smtClean="0"/>
-              <a:t>‹#›</a:t>
+              <a:t>‹N›</a:t>
             </a:fld>
             <a:endParaRPr lang="en-GB"/>
           </a:p>
@@ -1544,7 +1637,7 @@
           <a:p>
             <a:fld id="{2DD104BE-0EAA-4A20-A3C6-F09237843F02}" type="datetimeFigureOut">
               <a:rPr lang="en-GB" smtClean="0"/>
-              <a:t>10/10/2023</a:t>
+              <a:t>13/10/2023</a:t>
             </a:fld>
             <a:endParaRPr lang="en-GB"/>
           </a:p>
@@ -1586,7 +1679,7 @@
           <a:p>
             <a:fld id="{F1887760-7E0C-4499-A274-308086744EC6}" type="slidenum">
               <a:rPr lang="en-GB" smtClean="0"/>
-              <a:t>‹#›</a:t>
+              <a:t>‹N›</a:t>
             </a:fld>
             <a:endParaRPr lang="en-GB"/>
           </a:p>
@@ -1776,7 +1869,7 @@
           <a:p>
             <a:fld id="{2DD104BE-0EAA-4A20-A3C6-F09237843F02}" type="datetimeFigureOut">
               <a:rPr lang="en-GB" smtClean="0"/>
-              <a:t>10/10/2023</a:t>
+              <a:t>13/10/2023</a:t>
             </a:fld>
             <a:endParaRPr lang="en-GB"/>
           </a:p>
@@ -1818,7 +1911,7 @@
           <a:p>
             <a:fld id="{F1887760-7E0C-4499-A274-308086744EC6}" type="slidenum">
               <a:rPr lang="en-GB" smtClean="0"/>
-              <a:t>‹#›</a:t>
+              <a:t>‹N›</a:t>
             </a:fld>
             <a:endParaRPr lang="en-GB"/>
           </a:p>
@@ -2143,7 +2236,7 @@
           <a:p>
             <a:fld id="{2DD104BE-0EAA-4A20-A3C6-F09237843F02}" type="datetimeFigureOut">
               <a:rPr lang="en-GB" smtClean="0"/>
-              <a:t>10/10/2023</a:t>
+              <a:t>13/10/2023</a:t>
             </a:fld>
             <a:endParaRPr lang="en-GB"/>
           </a:p>
@@ -2185,7 +2278,7 @@
           <a:p>
             <a:fld id="{F1887760-7E0C-4499-A274-308086744EC6}" type="slidenum">
               <a:rPr lang="en-GB" smtClean="0"/>
-              <a:t>‹#›</a:t>
+              <a:t>‹N›</a:t>
             </a:fld>
             <a:endParaRPr lang="en-GB"/>
           </a:p>
@@ -2261,7 +2354,7 @@
           <a:p>
             <a:fld id="{2DD104BE-0EAA-4A20-A3C6-F09237843F02}" type="datetimeFigureOut">
               <a:rPr lang="en-GB" smtClean="0"/>
-              <a:t>10/10/2023</a:t>
+              <a:t>13/10/2023</a:t>
             </a:fld>
             <a:endParaRPr lang="en-GB"/>
           </a:p>
@@ -2303,7 +2396,7 @@
           <a:p>
             <a:fld id="{F1887760-7E0C-4499-A274-308086744EC6}" type="slidenum">
               <a:rPr lang="en-GB" smtClean="0"/>
-              <a:t>‹#›</a:t>
+              <a:t>‹N›</a:t>
             </a:fld>
             <a:endParaRPr lang="en-GB"/>
           </a:p>
@@ -2356,7 +2449,7 @@
           <a:p>
             <a:fld id="{2DD104BE-0EAA-4A20-A3C6-F09237843F02}" type="datetimeFigureOut">
               <a:rPr lang="en-GB" smtClean="0"/>
-              <a:t>10/10/2023</a:t>
+              <a:t>13/10/2023</a:t>
             </a:fld>
             <a:endParaRPr lang="en-GB"/>
           </a:p>
@@ -2398,7 +2491,7 @@
           <a:p>
             <a:fld id="{F1887760-7E0C-4499-A274-308086744EC6}" type="slidenum">
               <a:rPr lang="en-GB" smtClean="0"/>
-              <a:t>‹#›</a:t>
+              <a:t>‹N›</a:t>
             </a:fld>
             <a:endParaRPr lang="en-GB"/>
           </a:p>
@@ -2633,7 +2726,7 @@
           <a:p>
             <a:fld id="{2DD104BE-0EAA-4A20-A3C6-F09237843F02}" type="datetimeFigureOut">
               <a:rPr lang="en-GB" smtClean="0"/>
-              <a:t>10/10/2023</a:t>
+              <a:t>13/10/2023</a:t>
             </a:fld>
             <a:endParaRPr lang="en-GB"/>
           </a:p>
@@ -2675,7 +2768,7 @@
           <a:p>
             <a:fld id="{F1887760-7E0C-4499-A274-308086744EC6}" type="slidenum">
               <a:rPr lang="en-GB" smtClean="0"/>
-              <a:t>‹#›</a:t>
+              <a:t>‹N›</a:t>
             </a:fld>
             <a:endParaRPr lang="en-GB"/>
           </a:p>
@@ -2890,7 +2983,7 @@
           <a:p>
             <a:fld id="{2DD104BE-0EAA-4A20-A3C6-F09237843F02}" type="datetimeFigureOut">
               <a:rPr lang="en-GB" smtClean="0"/>
-              <a:t>10/10/2023</a:t>
+              <a:t>13/10/2023</a:t>
             </a:fld>
             <a:endParaRPr lang="en-GB"/>
           </a:p>
@@ -2932,7 +3025,7 @@
           <a:p>
             <a:fld id="{F1887760-7E0C-4499-A274-308086744EC6}" type="slidenum">
               <a:rPr lang="en-GB" smtClean="0"/>
-              <a:t>‹#›</a:t>
+              <a:t>‹N›</a:t>
             </a:fld>
             <a:endParaRPr lang="en-GB"/>
           </a:p>
@@ -3103,7 +3196,7 @@
           <a:p>
             <a:fld id="{2DD104BE-0EAA-4A20-A3C6-F09237843F02}" type="datetimeFigureOut">
               <a:rPr lang="en-GB" smtClean="0"/>
-              <a:t>10/10/2023</a:t>
+              <a:t>13/10/2023</a:t>
             </a:fld>
             <a:endParaRPr lang="en-GB"/>
           </a:p>
@@ -3181,7 +3274,7 @@
           <a:p>
             <a:fld id="{F1887760-7E0C-4499-A274-308086744EC6}" type="slidenum">
               <a:rPr lang="en-GB" smtClean="0"/>
-              <a:t>‹#›</a:t>
+              <a:t>‹N›</a:t>
             </a:fld>
             <a:endParaRPr lang="en-GB"/>
           </a:p>
@@ -3547,12 +3640,67 @@
           </a:prstGeom>
         </p:spPr>
       </p:pic>
+      <p:sp>
+        <p:nvSpPr>
+          <p:cNvPr id="17" name="Oval 16">
+            <a:extLst>
+              <a:ext uri="{FF2B5EF4-FFF2-40B4-BE49-F238E27FC236}">
+                <a16:creationId xmlns:a16="http://schemas.microsoft.com/office/drawing/2014/main" id="{FE0C34CF-3C52-D346-AE99-748C15729FE0}"/>
+              </a:ext>
+            </a:extLst>
+          </p:cNvPr>
+          <p:cNvSpPr/>
+          <p:nvPr/>
+        </p:nvSpPr>
+        <p:spPr>
+          <a:xfrm>
+            <a:off x="900111" y="1538284"/>
+            <a:ext cx="95249" cy="600075"/>
+          </a:xfrm>
+          <a:prstGeom prst="ellipse">
+            <a:avLst/>
+          </a:prstGeom>
+          <a:noFill/>
+          <a:ln w="3175">
+            <a:solidFill>
+              <a:schemeClr val="tx1">
+                <a:lumMod val="65000"/>
+                <a:lumOff val="35000"/>
+              </a:schemeClr>
+            </a:solidFill>
+          </a:ln>
+        </p:spPr>
+        <p:style>
+          <a:lnRef idx="2">
+            <a:schemeClr val="accent1">
+              <a:shade val="50000"/>
+            </a:schemeClr>
+          </a:lnRef>
+          <a:fillRef idx="1">
+            <a:schemeClr val="accent1"/>
+          </a:fillRef>
+          <a:effectRef idx="0">
+            <a:schemeClr val="accent1"/>
+          </a:effectRef>
+          <a:fontRef idx="minor">
+            <a:schemeClr val="lt1"/>
+          </a:fontRef>
+        </p:style>
+        <p:txBody>
+          <a:bodyPr rtlCol="0" anchor="ctr"/>
+          <a:lstStyle/>
+          <a:p>
+            <a:pPr algn="ctr"/>
+            <a:endParaRPr lang="en-GB"/>
+          </a:p>
+        </p:txBody>
+      </p:sp>
       <p:pic>
         <p:nvPicPr>
-          <p:cNvPr id="7" name="Picture 6" descr="A map of the area with different colored areas&#10;&#10;Description automatically generated with medium confidence">
+          <p:cNvPr id="20" name="Immagine 19" descr="Immagine che contiene testo, diagramma, mappa&#10;&#10;Descrizione generata automaticamente">
             <a:extLst>
               <a:ext uri="{FF2B5EF4-FFF2-40B4-BE49-F238E27FC236}">
-                <a16:creationId xmlns:a16="http://schemas.microsoft.com/office/drawing/2014/main" id="{A252A875-1706-DF84-0670-4CFDB46BA51A}"/>
+                <a16:creationId xmlns:a16="http://schemas.microsoft.com/office/drawing/2014/main" id="{25AAFF9D-6E71-039E-867B-CED568217B78}"/>
               </a:ext>
             </a:extLst>
           </p:cNvPr>
@@ -3569,13 +3717,13 @@
               </a:ext>
             </a:extLst>
           </a:blip>
-          <a:srcRect l="4053" t="7157" r="39491" b="1879"/>
+          <a:srcRect l="3748" t="6740" r="39024" b="1666"/>
           <a:stretch/>
         </p:blipFill>
         <p:spPr>
           <a:xfrm>
-            <a:off x="4238626" y="746125"/>
-            <a:ext cx="2544298" cy="2900362"/>
+            <a:off x="4317049" y="707747"/>
+            <a:ext cx="2526795" cy="2861224"/>
           </a:xfrm>
           <a:prstGeom prst="rect">
             <a:avLst/>
@@ -3596,7 +3744,7 @@
         </p:nvGrpSpPr>
         <p:grpSpPr>
           <a:xfrm>
-            <a:off x="5586417" y="2900369"/>
+            <a:off x="5638671" y="2848115"/>
             <a:ext cx="1198756" cy="547688"/>
             <a:chOff x="5534024" y="2867028"/>
             <a:chExt cx="1198756" cy="547688"/>
@@ -3980,56 +4128,123 @@
       </p:grpSp>
       <p:sp>
         <p:nvSpPr>
-          <p:cNvPr id="17" name="Oval 16">
+          <p:cNvPr id="24" name="TextBox 23">
             <a:extLst>
               <a:ext uri="{FF2B5EF4-FFF2-40B4-BE49-F238E27FC236}">
-                <a16:creationId xmlns:a16="http://schemas.microsoft.com/office/drawing/2014/main" id="{FE0C34CF-3C52-D346-AE99-748C15729FE0}"/>
+                <a16:creationId xmlns:a16="http://schemas.microsoft.com/office/drawing/2014/main" id="{2F6F4F95-4456-CA27-EDD8-D4E77557DB2F}"/>
               </a:ext>
             </a:extLst>
           </p:cNvPr>
-          <p:cNvSpPr/>
+          <p:cNvSpPr txBox="1"/>
           <p:nvPr/>
         </p:nvSpPr>
         <p:spPr>
           <a:xfrm>
-            <a:off x="900111" y="623885"/>
-            <a:ext cx="95249" cy="600075"/>
+            <a:off x="5402228" y="438372"/>
+            <a:ext cx="216000" cy="215444"/>
           </a:xfrm>
-          <a:prstGeom prst="ellipse">
+          <a:prstGeom prst="rect">
             <a:avLst/>
           </a:prstGeom>
-          <a:noFill/>
+          <a:solidFill>
+            <a:schemeClr val="bg1"/>
+          </a:solidFill>
           <a:ln w="3175">
             <a:solidFill>
               <a:schemeClr val="tx1">
-                <a:lumMod val="65000"/>
-                <a:lumOff val="35000"/>
+                <a:lumMod val="75000"/>
+                <a:lumOff val="25000"/>
               </a:schemeClr>
             </a:solidFill>
           </a:ln>
         </p:spPr>
-        <p:style>
-          <a:lnRef idx="2">
-            <a:schemeClr val="accent1">
-              <a:shade val="50000"/>
-            </a:schemeClr>
-          </a:lnRef>
-          <a:fillRef idx="1">
-            <a:schemeClr val="accent1"/>
-          </a:fillRef>
-          <a:effectRef idx="0">
-            <a:schemeClr val="accent1"/>
-          </a:effectRef>
-          <a:fontRef idx="minor">
-            <a:schemeClr val="lt1"/>
-          </a:fontRef>
-        </p:style>
-        <p:txBody>
-          <a:bodyPr rtlCol="0" anchor="ctr"/>
+        <p:txBody>
+          <a:bodyPr wrap="square" rtlCol="0">
+            <a:spAutoFit/>
+          </a:bodyPr>
           <a:lstStyle/>
           <a:p>
             <a:pPr algn="ctr"/>
-            <a:endParaRPr lang="en-GB"/>
+            <a:r>
+              <a:rPr lang="es-ES" sz="800" dirty="0">
+                <a:solidFill>
+                  <a:schemeClr val="tx1">
+                    <a:lumMod val="75000"/>
+                    <a:lumOff val="25000"/>
+                  </a:schemeClr>
+                </a:solidFill>
+              </a:rPr>
+              <a:t>b</a:t>
+            </a:r>
+            <a:endParaRPr lang="en-GB" sz="800" dirty="0">
+              <a:solidFill>
+                <a:schemeClr val="tx1">
+                  <a:lumMod val="75000"/>
+                  <a:lumOff val="25000"/>
+                </a:schemeClr>
+              </a:solidFill>
+            </a:endParaRPr>
+          </a:p>
+        </p:txBody>
+      </p:sp>
+      <p:sp>
+        <p:nvSpPr>
+          <p:cNvPr id="25" name="TextBox 24">
+            <a:extLst>
+              <a:ext uri="{FF2B5EF4-FFF2-40B4-BE49-F238E27FC236}">
+                <a16:creationId xmlns:a16="http://schemas.microsoft.com/office/drawing/2014/main" id="{3E8F90AB-5F87-A815-AE7B-A4BD0480AE01}"/>
+              </a:ext>
+            </a:extLst>
+          </p:cNvPr>
+          <p:cNvSpPr txBox="1"/>
+          <p:nvPr/>
+        </p:nvSpPr>
+        <p:spPr>
+          <a:xfrm>
+            <a:off x="4284613" y="222928"/>
+            <a:ext cx="216000" cy="215444"/>
+          </a:xfrm>
+          <a:prstGeom prst="rect">
+            <a:avLst/>
+          </a:prstGeom>
+          <a:solidFill>
+            <a:schemeClr val="bg1"/>
+          </a:solidFill>
+          <a:ln w="3175">
+            <a:solidFill>
+              <a:schemeClr val="tx1">
+                <a:lumMod val="75000"/>
+                <a:lumOff val="25000"/>
+              </a:schemeClr>
+            </a:solidFill>
+          </a:ln>
+        </p:spPr>
+        <p:txBody>
+          <a:bodyPr wrap="square" rtlCol="0">
+            <a:spAutoFit/>
+          </a:bodyPr>
+          <a:lstStyle/>
+          <a:p>
+            <a:pPr algn="ctr"/>
+            <a:r>
+              <a:rPr lang="es-ES" sz="800" dirty="0">
+                <a:solidFill>
+                  <a:schemeClr val="tx1">
+                    <a:lumMod val="75000"/>
+                    <a:lumOff val="25000"/>
+                  </a:schemeClr>
+                </a:solidFill>
+              </a:rPr>
+              <a:t>a</a:t>
+            </a:r>
+            <a:endParaRPr lang="en-GB" sz="800" dirty="0">
+              <a:solidFill>
+                <a:schemeClr val="tx1">
+                  <a:lumMod val="75000"/>
+                  <a:lumOff val="25000"/>
+                </a:schemeClr>
+              </a:solidFill>
+            </a:endParaRPr>
           </a:p>
         </p:txBody>
       </p:sp>
@@ -4049,9 +4264,9 @@
           <p:nvPr/>
         </p:nvCxnSpPr>
         <p:spPr>
-          <a:xfrm>
-            <a:off x="947736" y="623885"/>
-            <a:ext cx="3444877" cy="533403"/>
+          <a:xfrm flipV="1">
+            <a:off x="947736" y="1124793"/>
+            <a:ext cx="3524801" cy="413491"/>
           </a:xfrm>
           <a:prstGeom prst="line">
             <a:avLst/>
@@ -4097,8 +4312,8 @@
         </p:nvCxnSpPr>
         <p:spPr>
           <a:xfrm>
-            <a:off x="947736" y="1223960"/>
-            <a:ext cx="3434356" cy="2319340"/>
+            <a:off x="947736" y="2138359"/>
+            <a:ext cx="3524801" cy="1320986"/>
           </a:xfrm>
           <a:prstGeom prst="line">
             <a:avLst/>
@@ -4127,128 +4342,6 @@
           </a:fontRef>
         </p:style>
       </p:cxnSp>
-      <p:sp>
-        <p:nvSpPr>
-          <p:cNvPr id="24" name="TextBox 23">
-            <a:extLst>
-              <a:ext uri="{FF2B5EF4-FFF2-40B4-BE49-F238E27FC236}">
-                <a16:creationId xmlns:a16="http://schemas.microsoft.com/office/drawing/2014/main" id="{2F6F4F95-4456-CA27-EDD8-D4E77557DB2F}"/>
-              </a:ext>
-            </a:extLst>
-          </p:cNvPr>
-          <p:cNvSpPr txBox="1"/>
-          <p:nvPr/>
-        </p:nvSpPr>
-        <p:spPr>
-          <a:xfrm>
-            <a:off x="5402775" y="516163"/>
-            <a:ext cx="216000" cy="215444"/>
-          </a:xfrm>
-          <a:prstGeom prst="rect">
-            <a:avLst/>
-          </a:prstGeom>
-          <a:solidFill>
-            <a:schemeClr val="bg1"/>
-          </a:solidFill>
-          <a:ln w="3175">
-            <a:solidFill>
-              <a:schemeClr val="tx1">
-                <a:lumMod val="75000"/>
-                <a:lumOff val="25000"/>
-              </a:schemeClr>
-            </a:solidFill>
-          </a:ln>
-        </p:spPr>
-        <p:txBody>
-          <a:bodyPr wrap="square" rtlCol="0">
-            <a:spAutoFit/>
-          </a:bodyPr>
-          <a:lstStyle/>
-          <a:p>
-            <a:pPr algn="ctr"/>
-            <a:r>
-              <a:rPr lang="es-ES" sz="800" dirty="0">
-                <a:solidFill>
-                  <a:schemeClr val="tx1">
-                    <a:lumMod val="75000"/>
-                    <a:lumOff val="25000"/>
-                  </a:schemeClr>
-                </a:solidFill>
-              </a:rPr>
-              <a:t>b</a:t>
-            </a:r>
-            <a:endParaRPr lang="en-GB" sz="800" dirty="0">
-              <a:solidFill>
-                <a:schemeClr val="tx1">
-                  <a:lumMod val="75000"/>
-                  <a:lumOff val="25000"/>
-                </a:schemeClr>
-              </a:solidFill>
-            </a:endParaRPr>
-          </a:p>
-        </p:txBody>
-      </p:sp>
-      <p:sp>
-        <p:nvSpPr>
-          <p:cNvPr id="25" name="TextBox 24">
-            <a:extLst>
-              <a:ext uri="{FF2B5EF4-FFF2-40B4-BE49-F238E27FC236}">
-                <a16:creationId xmlns:a16="http://schemas.microsoft.com/office/drawing/2014/main" id="{3E8F90AB-5F87-A815-AE7B-A4BD0480AE01}"/>
-              </a:ext>
-            </a:extLst>
-          </p:cNvPr>
-          <p:cNvSpPr txBox="1"/>
-          <p:nvPr/>
-        </p:nvSpPr>
-        <p:spPr>
-          <a:xfrm>
-            <a:off x="4284613" y="222928"/>
-            <a:ext cx="216000" cy="215444"/>
-          </a:xfrm>
-          <a:prstGeom prst="rect">
-            <a:avLst/>
-          </a:prstGeom>
-          <a:solidFill>
-            <a:schemeClr val="bg1"/>
-          </a:solidFill>
-          <a:ln w="3175">
-            <a:solidFill>
-              <a:schemeClr val="tx1">
-                <a:lumMod val="75000"/>
-                <a:lumOff val="25000"/>
-              </a:schemeClr>
-            </a:solidFill>
-          </a:ln>
-        </p:spPr>
-        <p:txBody>
-          <a:bodyPr wrap="square" rtlCol="0">
-            <a:spAutoFit/>
-          </a:bodyPr>
-          <a:lstStyle/>
-          <a:p>
-            <a:pPr algn="ctr"/>
-            <a:r>
-              <a:rPr lang="es-ES" sz="800" dirty="0">
-                <a:solidFill>
-                  <a:schemeClr val="tx1">
-                    <a:lumMod val="75000"/>
-                    <a:lumOff val="25000"/>
-                  </a:schemeClr>
-                </a:solidFill>
-              </a:rPr>
-              <a:t>a</a:t>
-            </a:r>
-            <a:endParaRPr lang="en-GB" sz="800" dirty="0">
-              <a:solidFill>
-                <a:schemeClr val="tx1">
-                  <a:lumMod val="75000"/>
-                  <a:lumOff val="25000"/>
-                </a:schemeClr>
-              </a:solidFill>
-            </a:endParaRPr>
-          </a:p>
-        </p:txBody>
-      </p:sp>
     </p:spTree>
     <p:extLst>
       <p:ext uri="{BB962C8B-B14F-4D97-AF65-F5344CB8AC3E}">

</xml_diff>